<commit_message>
Scala 更新 类 trait apply 集合
</commit_message>
<xml_diff>
--- a/document/Scala入门.pptx
+++ b/document/Scala入门.pptx
@@ -12113,7 +12113,6 @@
             </a:pPr>
             <a:r>
               <a:rPr lang="zh-CN" altLang="en-US" sz="2000" b="1" dirty="0">
-                <a:ln/>
                 <a:solidFill>
                   <a:schemeClr val="tx1"/>
                 </a:solidFill>
@@ -12123,7 +12122,6 @@
               <a:t>导学</a:t>
             </a:r>
             <a:endParaRPr lang="en-US" altLang="zh-CN" sz="2000" b="1" dirty="0">
-              <a:ln/>
               <a:solidFill>
                 <a:schemeClr val="tx1"/>
               </a:solidFill>
@@ -12139,7 +12137,6 @@
             </a:pPr>
             <a:r>
               <a:rPr lang="en-US" altLang="zh-CN" sz="2000" b="1" dirty="0">
-                <a:ln/>
                 <a:solidFill>
                   <a:schemeClr val="tx1"/>
                 </a:solidFill>
@@ -12150,7 +12147,6 @@
             </a:r>
             <a:r>
               <a:rPr lang="zh-CN" altLang="en-US" sz="2000" b="1" dirty="0">
-                <a:ln/>
                 <a:solidFill>
                   <a:schemeClr val="tx1"/>
                 </a:solidFill>
@@ -12160,7 +12156,6 @@
               <a:t>入门</a:t>
             </a:r>
             <a:endParaRPr lang="zh-CN" altLang="en-US" sz="2000" b="1" dirty="0">
-              <a:ln/>
               <a:solidFill>
                 <a:schemeClr val="tx1"/>
               </a:solidFill>
@@ -12176,7 +12171,6 @@
             </a:pPr>
             <a:r>
               <a:rPr lang="zh-CN" altLang="en-US" sz="2000" b="1" dirty="0">
-                <a:ln/>
                 <a:solidFill>
                   <a:schemeClr val="tx1"/>
                 </a:solidFill>
@@ -12186,7 +12180,6 @@
               <a:t>基础语法</a:t>
             </a:r>
             <a:endParaRPr lang="zh-CN" altLang="en-US" sz="2000" b="1" dirty="0">
-              <a:ln/>
               <a:solidFill>
                 <a:schemeClr val="tx1"/>
               </a:solidFill>
@@ -12202,7 +12195,6 @@
             </a:pPr>
             <a:r>
               <a:rPr lang="zh-CN" altLang="en-US" sz="2000" b="1" dirty="0">
-                <a:ln/>
                 <a:solidFill>
                   <a:schemeClr val="tx1"/>
                 </a:solidFill>
@@ -12212,7 +12204,6 @@
               <a:t>函数、对象、集合和模式匹配</a:t>
             </a:r>
             <a:endParaRPr lang="zh-CN" altLang="en-US" sz="2000" b="1" dirty="0">
-              <a:ln/>
               <a:solidFill>
                 <a:schemeClr val="tx1"/>
               </a:solidFill>
@@ -12228,7 +12219,6 @@
             </a:pPr>
             <a:r>
               <a:rPr lang="zh-CN" altLang="en-US" sz="2000" b="1" dirty="0">
-                <a:ln/>
                 <a:solidFill>
                   <a:schemeClr val="tx1"/>
                 </a:solidFill>
@@ -12238,7 +12228,6 @@
               <a:t>简单使用实例</a:t>
             </a:r>
             <a:endParaRPr lang="zh-CN" altLang="en-US" sz="2000" b="1" dirty="0">
-              <a:ln/>
               <a:solidFill>
                 <a:schemeClr val="tx1"/>
               </a:solidFill>
@@ -12254,7 +12243,6 @@
             </a:pPr>
             <a:r>
               <a:rPr lang="en-US" altLang="zh-CN" sz="2000" b="1" dirty="0">
-                <a:ln/>
                 <a:solidFill>
                   <a:schemeClr val="tx1"/>
                 </a:solidFill>
@@ -12265,7 +12253,6 @@
             </a:r>
             <a:r>
               <a:rPr lang="zh-CN" altLang="en-US" sz="2000" b="1" dirty="0">
-                <a:ln/>
                 <a:solidFill>
                   <a:schemeClr val="tx1"/>
                 </a:solidFill>
@@ -12275,7 +12262,6 @@
               <a:t>进阶</a:t>
             </a:r>
             <a:endParaRPr lang="zh-CN" altLang="en-US" sz="2000" b="1" dirty="0">
-              <a:ln/>
               <a:solidFill>
                 <a:schemeClr val="tx1"/>
               </a:solidFill>
@@ -12291,7 +12277,6 @@
             </a:pPr>
             <a:r>
               <a:rPr lang="zh-CN" altLang="en-US" sz="2000" b="1" dirty="0">
-                <a:ln/>
                 <a:solidFill>
                   <a:schemeClr val="tx1"/>
                 </a:solidFill>
@@ -12301,7 +12286,6 @@
               <a:t>函数高级操作</a:t>
             </a:r>
             <a:endParaRPr lang="zh-CN" altLang="en-US" sz="2000" b="1" dirty="0">
-              <a:ln/>
               <a:solidFill>
                 <a:schemeClr val="tx1"/>
               </a:solidFill>
@@ -12317,7 +12301,6 @@
             </a:pPr>
             <a:r>
               <a:rPr lang="zh-CN" altLang="en-US" sz="2000" b="1" dirty="0">
-                <a:ln/>
                 <a:solidFill>
                   <a:schemeClr val="tx1"/>
                 </a:solidFill>
@@ -12327,7 +12310,6 @@
               <a:t>隐式转换</a:t>
             </a:r>
             <a:endParaRPr lang="zh-CN" altLang="en-US" sz="2000" b="1" dirty="0">
-              <a:ln/>
               <a:solidFill>
                 <a:schemeClr val="tx1"/>
               </a:solidFill>
@@ -12343,7 +12325,6 @@
             </a:pPr>
             <a:r>
               <a:rPr lang="zh-CN" altLang="en-US" sz="2000" b="1" dirty="0">
-                <a:ln/>
                 <a:solidFill>
                   <a:schemeClr val="tx1"/>
                 </a:solidFill>
@@ -12353,7 +12334,6 @@
               <a:t>外部数据操作</a:t>
             </a:r>
             <a:endParaRPr lang="zh-CN" altLang="en-US" sz="2000" b="1" dirty="0">
-              <a:ln/>
               <a:solidFill>
                 <a:schemeClr val="tx1"/>
               </a:solidFill>
@@ -15198,7 +15178,7 @@
         <p:spPr>
           <a:xfrm>
             <a:off x="312420" y="1280160"/>
-            <a:ext cx="7917180" cy="4699635"/>
+            <a:ext cx="7917180" cy="5315585"/>
           </a:xfrm>
           <a:prstGeom prst="rect">
             <a:avLst/>
@@ -15381,6 +15361,82 @@
               <a:t>）</a:t>
             </a:r>
             <a:endParaRPr lang="zh-CN" altLang="en-US" sz="2000"/>
+          </a:p>
+          <a:p>
+            <a:pPr lvl="0"/>
+            <a:r>
+              <a:rPr lang="zh-CN" altLang="en-US" sz="2285"/>
+              <a:t>类的定义和使用</a:t>
+            </a:r>
+            <a:endParaRPr lang="zh-CN" altLang="en-US" sz="2285"/>
+          </a:p>
+          <a:p>
+            <a:pPr lvl="0"/>
+            <a:r>
+              <a:rPr lang="zh-CN" altLang="en-US" sz="2285"/>
+              <a:t>主构造器和附属构造器</a:t>
+            </a:r>
+            <a:endParaRPr lang="zh-CN" altLang="en-US" sz="2285"/>
+          </a:p>
+          <a:p>
+            <a:pPr lvl="0"/>
+            <a:r>
+              <a:rPr lang="zh-CN" altLang="en-US" sz="2285"/>
+              <a:t>继承</a:t>
+            </a:r>
+            <a:endParaRPr lang="zh-CN" altLang="en-US" sz="2285"/>
+          </a:p>
+          <a:p>
+            <a:pPr lvl="0"/>
+            <a:r>
+              <a:rPr lang="zh-CN" altLang="en-US" sz="2285"/>
+              <a:t>重写</a:t>
+            </a:r>
+            <a:endParaRPr lang="zh-CN" altLang="en-US" sz="2285"/>
+          </a:p>
+          <a:p>
+            <a:pPr lvl="0"/>
+            <a:r>
+              <a:rPr lang="zh-CN" altLang="en-US" sz="2285"/>
+              <a:t>抽象类</a:t>
+            </a:r>
+            <a:endParaRPr lang="zh-CN" altLang="en-US" sz="2285"/>
+          </a:p>
+          <a:p>
+            <a:pPr lvl="0"/>
+            <a:r>
+              <a:rPr lang="zh-CN" altLang="en-US" sz="2285"/>
+              <a:t>伴生类和伴生对象</a:t>
+            </a:r>
+            <a:endParaRPr lang="zh-CN" altLang="en-US" sz="2285"/>
+          </a:p>
+          <a:p>
+            <a:pPr lvl="0"/>
+            <a:r>
+              <a:rPr lang="en-US" altLang="zh-CN" sz="2285"/>
+              <a:t>apply</a:t>
+            </a:r>
+            <a:r>
+              <a:rPr lang="zh-CN" altLang="en-US" sz="2285"/>
+              <a:t>方法</a:t>
+            </a:r>
+            <a:endParaRPr lang="zh-CN" altLang="en-US" sz="2285"/>
+          </a:p>
+          <a:p>
+            <a:pPr lvl="0"/>
+            <a:r>
+              <a:rPr lang="en-US" altLang="zh-CN" sz="2285"/>
+              <a:t>case class</a:t>
+            </a:r>
+            <a:endParaRPr lang="en-US" altLang="zh-CN" sz="2285"/>
+          </a:p>
+          <a:p>
+            <a:pPr lvl="0"/>
+            <a:r>
+              <a:rPr lang="en-US" altLang="zh-CN" sz="2285"/>
+              <a:t>Trait</a:t>
+            </a:r>
+            <a:endParaRPr lang="zh-CN" altLang="en-US" sz="2285"/>
           </a:p>
           <a:p>
             <a:pPr lvl="1"/>

</xml_diff>